<commit_message>
new imaes folder and minor fixes
</commit_message>
<xml_diff>
--- a/Soutenance/PrésentationP8.pptx
+++ b/Soutenance/PrésentationP8.pptx
@@ -214,7 +214,7 @@
           <a:p>
             <a:fld id="{0D49AA7D-7591-FC4C-BD95-420ECF8DA599}" type="datetimeFigureOut">
               <a:rPr lang="fr-FR" smtClean="0"/>
-              <a:t>12/09/2024</a:t>
+              <a:t>16/09/2024</a:t>
             </a:fld>
             <a:endParaRPr lang="fr-FR"/>
           </a:p>
@@ -481,6 +481,90 @@
 </p:notesMaster>
 </file>
 
+<file path=ppt/notesSlides/notesSlide1.xml><?xml version="1.0" encoding="utf-8"?>
+<p:notes xmlns:a="http://schemas.openxmlformats.org/drawingml/2006/main" xmlns:r="http://schemas.openxmlformats.org/officeDocument/2006/relationships" xmlns:p="http://schemas.openxmlformats.org/presentationml/2006/main">
+  <p:cSld>
+    <p:spTree>
+      <p:nvGrpSpPr>
+        <p:cNvPr id="1" name=""/>
+        <p:cNvGrpSpPr/>
+        <p:nvPr/>
+      </p:nvGrpSpPr>
+      <p:grpSpPr>
+        <a:xfrm>
+          <a:off x="0" y="0"/>
+          <a:ext cx="0" cy="0"/>
+          <a:chOff x="0" y="0"/>
+          <a:chExt cx="0" cy="0"/>
+        </a:xfrm>
+      </p:grpSpPr>
+      <p:sp>
+        <p:nvSpPr>
+          <p:cNvPr id="2" name="Espace réservé de l'image des diapositives 1"/>
+          <p:cNvSpPr>
+            <a:spLocks noGrp="1" noRot="1" noChangeAspect="1"/>
+          </p:cNvSpPr>
+          <p:nvPr>
+            <p:ph type="sldImg"/>
+          </p:nvPr>
+        </p:nvSpPr>
+        <p:spPr/>
+      </p:sp>
+      <p:sp>
+        <p:nvSpPr>
+          <p:cNvPr id="3" name="Espace réservé des notes 2"/>
+          <p:cNvSpPr>
+            <a:spLocks noGrp="1"/>
+          </p:cNvSpPr>
+          <p:nvPr>
+            <p:ph type="body" idx="1"/>
+          </p:nvPr>
+        </p:nvSpPr>
+        <p:spPr/>
+        <p:txBody>
+          <a:bodyPr/>
+          <a:lstStyle/>
+          <a:p>
+            <a:endParaRPr lang="fr-FR" dirty="0"/>
+          </a:p>
+        </p:txBody>
+      </p:sp>
+      <p:sp>
+        <p:nvSpPr>
+          <p:cNvPr id="4" name="Espace réservé du numéro de diapositive 3"/>
+          <p:cNvSpPr>
+            <a:spLocks noGrp="1"/>
+          </p:cNvSpPr>
+          <p:nvPr>
+            <p:ph type="sldNum" sz="quarter" idx="5"/>
+          </p:nvPr>
+        </p:nvSpPr>
+        <p:spPr/>
+        <p:txBody>
+          <a:bodyPr/>
+          <a:lstStyle/>
+          <a:p>
+            <a:fld id="{832C84D7-55FE-584B-A916-21522AC8F9A1}" type="slidenum">
+              <a:rPr lang="fr-FR" smtClean="0"/>
+              <a:t>12</a:t>
+            </a:fld>
+            <a:endParaRPr lang="fr-FR"/>
+          </a:p>
+        </p:txBody>
+      </p:sp>
+    </p:spTree>
+    <p:extLst>
+      <p:ext uri="{BB962C8B-B14F-4D97-AF65-F5344CB8AC3E}">
+        <p14:creationId xmlns:p14="http://schemas.microsoft.com/office/powerpoint/2010/main" val="1179654855"/>
+      </p:ext>
+    </p:extLst>
+  </p:cSld>
+  <p:clrMapOvr>
+    <a:masterClrMapping/>
+  </p:clrMapOvr>
+</p:notes>
+</file>
+
 <file path=ppt/slideLayouts/slideLayout1.xml><?xml version="1.0" encoding="utf-8"?>
 <p:sldLayout xmlns:a="http://schemas.openxmlformats.org/drawingml/2006/main" xmlns:r="http://schemas.openxmlformats.org/officeDocument/2006/relationships" xmlns:p="http://schemas.openxmlformats.org/presentationml/2006/main" showMasterSp="0" type="title" preserve="1">
   <p:cSld name="Diapositive de titre">
@@ -650,7 +734,7 @@
           <a:p>
             <a:fld id="{E271F846-9E2B-A943-A667-4C0FED0FE436}" type="datetimeFigureOut">
               <a:rPr lang="fr-FR" smtClean="0"/>
-              <a:t>12/09/2024</a:t>
+              <a:t>16/09/2024</a:t>
             </a:fld>
             <a:endParaRPr lang="fr-FR"/>
           </a:p>
@@ -980,7 +1064,7 @@
           <a:p>
             <a:fld id="{E271F846-9E2B-A943-A667-4C0FED0FE436}" type="datetimeFigureOut">
               <a:rPr lang="fr-FR" smtClean="0"/>
-              <a:t>12/09/2024</a:t>
+              <a:t>16/09/2024</a:t>
             </a:fld>
             <a:endParaRPr lang="fr-FR"/>
           </a:p>
@@ -1160,7 +1244,7 @@
           <a:p>
             <a:fld id="{E271F846-9E2B-A943-A667-4C0FED0FE436}" type="datetimeFigureOut">
               <a:rPr lang="fr-FR" smtClean="0"/>
-              <a:t>12/09/2024</a:t>
+              <a:t>16/09/2024</a:t>
             </a:fld>
             <a:endParaRPr lang="fr-FR"/>
           </a:p>
@@ -1330,7 +1414,7 @@
           <a:p>
             <a:fld id="{E271F846-9E2B-A943-A667-4C0FED0FE436}" type="datetimeFigureOut">
               <a:rPr lang="fr-FR" smtClean="0"/>
-              <a:t>12/09/2024</a:t>
+              <a:t>16/09/2024</a:t>
             </a:fld>
             <a:endParaRPr lang="fr-FR"/>
           </a:p>
@@ -1607,7 +1691,7 @@
           <a:p>
             <a:fld id="{E271F846-9E2B-A943-A667-4C0FED0FE436}" type="datetimeFigureOut">
               <a:rPr lang="fr-FR" smtClean="0"/>
-              <a:t>12/09/2024</a:t>
+              <a:t>16/09/2024</a:t>
             </a:fld>
             <a:endParaRPr lang="fr-FR"/>
           </a:p>
@@ -2001,7 +2085,7 @@
           <a:p>
             <a:fld id="{E271F846-9E2B-A943-A667-4C0FED0FE436}" type="datetimeFigureOut">
               <a:rPr lang="fr-FR" smtClean="0"/>
-              <a:t>12/09/2024</a:t>
+              <a:t>16/09/2024</a:t>
             </a:fld>
             <a:endParaRPr lang="fr-FR"/>
           </a:p>
@@ -2478,7 +2562,7 @@
           <a:p>
             <a:fld id="{E271F846-9E2B-A943-A667-4C0FED0FE436}" type="datetimeFigureOut">
               <a:rPr lang="fr-FR" smtClean="0"/>
-              <a:t>12/09/2024</a:t>
+              <a:t>16/09/2024</a:t>
             </a:fld>
             <a:endParaRPr lang="fr-FR"/>
           </a:p>
@@ -2596,7 +2680,7 @@
           <a:p>
             <a:fld id="{E271F846-9E2B-A943-A667-4C0FED0FE436}" type="datetimeFigureOut">
               <a:rPr lang="fr-FR" smtClean="0"/>
-              <a:t>12/09/2024</a:t>
+              <a:t>16/09/2024</a:t>
             </a:fld>
             <a:endParaRPr lang="fr-FR"/>
           </a:p>
@@ -2691,7 +2775,7 @@
           <a:p>
             <a:fld id="{E271F846-9E2B-A943-A667-4C0FED0FE436}" type="datetimeFigureOut">
               <a:rPr lang="fr-FR" smtClean="0"/>
-              <a:t>12/09/2024</a:t>
+              <a:t>16/09/2024</a:t>
             </a:fld>
             <a:endParaRPr lang="fr-FR"/>
           </a:p>
@@ -3037,7 +3121,7 @@
           <a:p>
             <a:fld id="{E271F846-9E2B-A943-A667-4C0FED0FE436}" type="datetimeFigureOut">
               <a:rPr lang="fr-FR" smtClean="0"/>
-              <a:t>12/09/2024</a:t>
+              <a:t>16/09/2024</a:t>
             </a:fld>
             <a:endParaRPr lang="fr-FR"/>
           </a:p>
@@ -3425,7 +3509,7 @@
           <a:p>
             <a:fld id="{E271F846-9E2B-A943-A667-4C0FED0FE436}" type="datetimeFigureOut">
               <a:rPr lang="fr-FR" smtClean="0"/>
-              <a:t>12/09/2024</a:t>
+              <a:t>16/09/2024</a:t>
             </a:fld>
             <a:endParaRPr lang="fr-FR"/>
           </a:p>
@@ -3703,7 +3787,7 @@
           <a:p>
             <a:fld id="{E271F846-9E2B-A943-A667-4C0FED0FE436}" type="datetimeFigureOut">
               <a:rPr lang="fr-FR" smtClean="0"/>
-              <a:t>12/09/2024</a:t>
+              <a:t>16/09/2024</a:t>
             </a:fld>
             <a:endParaRPr lang="fr-FR"/>
           </a:p>
@@ -4457,7 +4541,7 @@
             <a:pPr lvl="1"/>
             <a:r>
               <a:rPr lang="fr-CH" sz="1800" dirty="0"/>
-              <a:t>Router: on retrouve les chemins qui amènent ou non à une page.  </a:t>
+              <a:t>Router : on retrouve les chemins qui amènent ou non à une page.  </a:t>
             </a:r>
           </a:p>
           <a:p>
@@ -4651,29 +4735,47 @@
             <a:pPr lvl="1"/>
             <a:r>
               <a:rPr lang="fr-CH" sz="1800" i="0" dirty="0"/>
-              <a:t>Une page accueil</a:t>
-            </a:r>
+              <a:t>Une page </a:t>
+            </a:r>
+            <a:r>
+              <a:rPr lang="fr-CH" sz="1800" i="0" dirty="0" err="1"/>
+              <a:t>homepage</a:t>
+            </a:r>
+            <a:endParaRPr lang="fr-CH" sz="1800" i="0" dirty="0"/>
           </a:p>
           <a:p>
             <a:pPr lvl="1"/>
             <a:r>
               <a:rPr lang="fr-CH" sz="1800" i="0" dirty="0"/>
-              <a:t>Une page à propos </a:t>
+              <a:t>Une page about</a:t>
             </a:r>
           </a:p>
           <a:p>
             <a:pPr lvl="1"/>
             <a:r>
               <a:rPr lang="fr-CH" sz="1800" i="0" dirty="0"/>
-              <a:t>Une page logement </a:t>
+              <a:t>Une page </a:t>
+            </a:r>
+            <a:r>
+              <a:rPr lang="fr-CH" sz="1800" i="0" dirty="0" err="1"/>
+              <a:t>housing</a:t>
+            </a:r>
+            <a:r>
+              <a:rPr lang="fr-CH" sz="1800" i="0" dirty="0"/>
+              <a:t> </a:t>
             </a:r>
           </a:p>
           <a:p>
             <a:pPr lvl="1"/>
             <a:r>
               <a:rPr lang="fr-CH" sz="1800" i="0" dirty="0"/>
-              <a:t>Une page erreur</a:t>
-            </a:r>
+              <a:t>Une page </a:t>
+            </a:r>
+            <a:r>
+              <a:rPr lang="fr-CH" sz="1800" i="0" dirty="0" err="1"/>
+              <a:t>error</a:t>
+            </a:r>
+            <a:endParaRPr lang="fr-CH" sz="1800" i="0" dirty="0"/>
           </a:p>
           <a:p>
             <a:pPr lvl="1"/>
@@ -4682,7 +4784,15 @@
           <a:p>
             <a:r>
               <a:rPr lang="fr-CH" dirty="0"/>
-              <a:t>Chaque page possède des composants qui peuvent être réutilisés su différentes pages (comme la bannière de la Homepage et de la page à propos).</a:t>
+              <a:t>Chaque page possède des composants qui peuvent être réutilisés sur différentes pages (exemple: banner pour la </a:t>
+            </a:r>
+            <a:r>
+              <a:rPr lang="fr-CH" dirty="0" err="1"/>
+              <a:t>homepage</a:t>
+            </a:r>
+            <a:r>
+              <a:rPr lang="fr-CH" dirty="0"/>
+              <a:t> et la page about).</a:t>
             </a:r>
             <a:endParaRPr lang="fr-CH" i="0" dirty="0"/>
           </a:p>
@@ -4786,7 +4896,7 @@
           <p:nvPr/>
         </p:nvPicPr>
         <p:blipFill>
-          <a:blip r:embed="rId2"/>
+          <a:blip r:embed="rId3"/>
           <a:srcRect/>
           <a:stretch/>
         </p:blipFill>
@@ -5321,7 +5431,15 @@
             <a:pPr lvl="1"/>
             <a:r>
               <a:rPr lang="fr-CH" sz="1800" i="0" dirty="0"/>
-              <a:t>On va utiliser des Hook UseState qui vont nous permettre de </a:t>
+              <a:t>On va utiliser des Hook UseState qui </a:t>
+            </a:r>
+            <a:r>
+              <a:rPr lang="fr-CH" sz="1800" i="0" dirty="0" err="1"/>
+              <a:t>vonta</a:t>
+            </a:r>
+            <a:r>
+              <a:rPr lang="fr-CH" sz="1800" i="0" dirty="0"/>
+              <a:t> nous </a:t>
             </a:r>
             <a:r>
               <a:rPr lang="fr-CH" sz="1800" b="0" i="0" strike="noStrike" dirty="0">
@@ -5330,7 +5448,7 @@
                 </a:solidFill>
                 <a:effectLst/>
               </a:rPr>
-              <a:t>gérer l'état d'un composant. Cela va nous permettre à des variables de changer de valeurs au cours du temps.</a:t>
+              <a:t>permettre à des variables de changer de valeurs au cours du temps.</a:t>
             </a:r>
             <a:endParaRPr lang="fr-CH" sz="1800" i="0" dirty="0"/>
           </a:p>
@@ -5344,7 +5462,7 @@
           <a:p>
             <a:pPr lvl="2"/>
             <a:r>
-              <a:rPr lang="fr-CH" sz="1600" i="0" dirty="0"/>
+              <a:rPr lang="fr-CH" sz="1600" dirty="0"/>
               <a:t>On met un temps de chargement de 2 secondes</a:t>
             </a:r>
           </a:p>
@@ -5362,20 +5480,12 @@
           <a:p>
             <a:pPr lvl="2"/>
             <a:r>
-              <a:rPr lang="fr-CH" sz="1600" i="0" dirty="0">
-                <a:solidFill>
-                  <a:srgbClr val="000000"/>
-                </a:solidFill>
-              </a:rPr>
-              <a:t>Si </a:t>
-            </a:r>
-            <a:r>
               <a:rPr lang="fr-CH" sz="1600" dirty="0">
                 <a:solidFill>
                   <a:srgbClr val="000000"/>
                 </a:solidFill>
               </a:rPr>
-              <a:t>on ne le trouve pas, on retourne le contenu de la page 404.</a:t>
+              <a:t>Si on ne le trouve pas, on retourne le contenu de la page 404.</a:t>
             </a:r>
             <a:endParaRPr lang="fr-CH" sz="1800" dirty="0">
               <a:solidFill>
@@ -5386,7 +5496,7 @@
           <a:p>
             <a:pPr lvl="1"/>
             <a:r>
-              <a:rPr lang="fr-CH" sz="1800" dirty="0">
+              <a:rPr lang="fr-CH" sz="1800" i="0" dirty="0">
                 <a:solidFill>
                   <a:srgbClr val="000000"/>
                 </a:solidFill>
@@ -5397,7 +5507,7 @@
           <a:p>
             <a:pPr lvl="1"/>
             <a:r>
-              <a:rPr lang="fr-CH" sz="1800" dirty="0">
+              <a:rPr lang="fr-CH" sz="1800" i="0" dirty="0">
                 <a:solidFill>
                   <a:srgbClr val="000000"/>
                 </a:solidFill>
@@ -5408,21 +5518,13 @@
           <a:p>
             <a:pPr lvl="1"/>
             <a:r>
-              <a:rPr lang="fr-CH" sz="1800" dirty="0">
+              <a:rPr lang="fr-CH" sz="1800" i="0" dirty="0">
                 <a:solidFill>
                   <a:srgbClr val="000000"/>
                 </a:solidFill>
               </a:rPr>
               <a:t>On utilise la méthode Map pour les tags et les équipements du logement.</a:t>
             </a:r>
-          </a:p>
-          <a:p>
-            <a:pPr lvl="1"/>
-            <a:endParaRPr lang="fr-CH" sz="1800" dirty="0">
-              <a:solidFill>
-                <a:srgbClr val="000000"/>
-              </a:solidFill>
-            </a:endParaRPr>
           </a:p>
         </p:txBody>
       </p:sp>
@@ -5567,7 +5669,7 @@
           <a:lstStyle/>
           <a:p>
             <a:r>
-              <a:rPr lang="fr-CH" sz="2200" dirty="0"/>
+              <a:rPr lang="fr-CH" dirty="0"/>
               <a:t>Les composants : </a:t>
             </a:r>
           </a:p>
@@ -5801,7 +5903,7 @@
           <a:lstStyle/>
           <a:p>
             <a:r>
-              <a:rPr lang="fr-CH" sz="2200" dirty="0"/>
+              <a:rPr lang="fr-CH" dirty="0"/>
               <a:t>Les composants : </a:t>
             </a:r>
           </a:p>
@@ -6391,7 +6493,7 @@
           <a:lstStyle/>
           <a:p>
             <a:r>
-              <a:rPr lang="fr-FR" sz="6700" dirty="0">
+              <a:rPr lang="fr-FR" sz="6700" u="sng" dirty="0">
                 <a:solidFill>
                   <a:srgbClr val="FF6060"/>
                 </a:solidFill>
@@ -6431,7 +6533,7 @@
           <a:p>
             <a:r>
               <a:rPr lang="fr-CH" sz="1800" dirty="0"/>
-              <a:t>Kasa, référence nationale dans de la location d’appartements entre particuliers en France fait appel à mes services de développeur web frontend.</a:t>
+              <a:t>Kasa, leader dans de la location d’appartements entre particuliers en France fait appel à mes services de développeur web frontend.</a:t>
             </a:r>
           </a:p>
           <a:p>
@@ -6582,7 +6684,7 @@
           <a:lstStyle/>
           <a:p>
             <a:r>
-              <a:rPr lang="fr-FR" sz="7200" dirty="0">
+              <a:rPr lang="fr-FR" sz="7200" u="sng" dirty="0">
                 <a:solidFill>
                   <a:srgbClr val="FF6060"/>
                 </a:solidFill>

</xml_diff>